<commit_message>
Updates for Essentials and Forms presentations
</commit_message>
<xml_diff>
--- a/Xamarin.Essentials/Xamarin.Essentials - Cross-Platform Native APIs.pptx
+++ b/Xamarin.Essentials/Xamarin.Essentials - Cross-Platform Native APIs.pptx
@@ -2163,7 +2163,7 @@
               <a:rPr lang="en-US" smtClean="0">
                 <a:latin typeface="Segoe UI" pitchFamily="34" charset="0"/>
               </a:rPr>
-              <a:t>7/5/2018 12:51 PM</a:t>
+              <a:t>4/1/2019 3:40 PM</a:t>
             </a:fld>
             <a:endParaRPr lang="en-US" dirty="0">
               <a:latin typeface="Segoe UI" pitchFamily="34" charset="0"/>
@@ -2457,7 +2457,7 @@
           <a:p>
             <a:fld id="{D18B56EA-E28F-4F92-9F16-7A6F2501B303}" type="datetime8">
               <a:rPr lang="en-US" smtClean="0"/>
-              <a:t>7/5/2018 12:51 PM</a:t>
+              <a:t>4/1/2019 3:40 PM</a:t>
             </a:fld>
             <a:endParaRPr lang="en-US" dirty="0"/>
           </a:p>
@@ -2824,7 +2824,7 @@
           <a:p>
             <a:fld id="{3313C66B-7AF5-40BA-8933-D16874FF94CC}" type="datetime8">
               <a:rPr lang="en-US" smtClean="0"/>
-              <a:t>7/5/2018 12:51 PM</a:t>
+              <a:t>4/1/2019 3:40 PM</a:t>
             </a:fld>
             <a:endParaRPr lang="en-US" dirty="0"/>
           </a:p>
@@ -3008,7 +3008,7 @@
           <a:p>
             <a:fld id="{D18B56EA-E28F-4F92-9F16-7A6F2501B303}" type="datetime8">
               <a:rPr lang="en-US" smtClean="0"/>
-              <a:t>7/5/2018 1:17 PM</a:t>
+              <a:t>4/1/2019 3:40 PM</a:t>
             </a:fld>
             <a:endParaRPr lang="en-US" dirty="0"/>
           </a:p>
@@ -3192,7 +3192,7 @@
           <a:p>
             <a:fld id="{D18B56EA-E28F-4F92-9F16-7A6F2501B303}" type="datetime8">
               <a:rPr lang="en-US" smtClean="0"/>
-              <a:t>7/5/2018 1:17 PM</a:t>
+              <a:t>4/1/2019 3:40 PM</a:t>
             </a:fld>
             <a:endParaRPr lang="en-US" dirty="0"/>
           </a:p>
@@ -3389,7 +3389,7 @@
           <a:p>
             <a:fld id="{D18B56EA-E28F-4F92-9F16-7A6F2501B303}" type="datetime8">
               <a:rPr lang="en-US" smtClean="0"/>
-              <a:t>7/5/2018 12:51 PM</a:t>
+              <a:t>4/1/2019 3:40 PM</a:t>
             </a:fld>
             <a:endParaRPr lang="en-US" dirty="0"/>
           </a:p>
@@ -3582,7 +3582,7 @@
           <a:p>
             <a:fld id="{D18B56EA-E28F-4F92-9F16-7A6F2501B303}" type="datetime8">
               <a:rPr lang="en-US" smtClean="0"/>
-              <a:t>7/5/2018 1:19 PM</a:t>
+              <a:t>4/1/2019 3:40 PM</a:t>
             </a:fld>
             <a:endParaRPr lang="en-US" dirty="0"/>
           </a:p>
@@ -3775,7 +3775,7 @@
           <a:p>
             <a:fld id="{D18B56EA-E28F-4F92-9F16-7A6F2501B303}" type="datetime8">
               <a:rPr lang="en-US" smtClean="0"/>
-              <a:t>7/5/2018 1:18 PM</a:t>
+              <a:t>4/1/2019 3:40 PM</a:t>
             </a:fld>
             <a:endParaRPr lang="en-US" dirty="0"/>
           </a:p>
@@ -3968,7 +3968,7 @@
           <a:p>
             <a:fld id="{D18B56EA-E28F-4F92-9F16-7A6F2501B303}" type="datetime8">
               <a:rPr lang="en-US" smtClean="0"/>
-              <a:t>7/5/2018 1:19 PM</a:t>
+              <a:t>4/1/2019 3:40 PM</a:t>
             </a:fld>
             <a:endParaRPr lang="en-US" dirty="0"/>
           </a:p>
@@ -4248,7 +4248,7 @@
                 <a:tabLst/>
                 <a:defRPr/>
               </a:pPr>
-              <a:t>7/5/2018 12:51 PM</a:t>
+              <a:t>4/1/2019 3:40 PM</a:t>
             </a:fld>
             <a:endParaRPr kumimoji="0" lang="en-US" sz="1800" b="0" i="0" u="none" strike="noStrike" kern="0" cap="none" spc="0" normalizeH="0" baseline="0" noProof="0" dirty="0">
               <a:ln>
@@ -4495,7 +4495,7 @@
           <a:p>
             <a:fld id="{D18B56EA-E28F-4F92-9F16-7A6F2501B303}" type="datetime8">
               <a:rPr lang="en-US" smtClean="0"/>
-              <a:t>7/5/2018 1:12 PM</a:t>
+              <a:t>4/1/2019 3:40 PM</a:t>
             </a:fld>
             <a:endParaRPr lang="en-US" dirty="0"/>
           </a:p>
@@ -4679,7 +4679,7 @@
           <a:p>
             <a:fld id="{D18B56EA-E28F-4F92-9F16-7A6F2501B303}" type="datetime8">
               <a:rPr lang="en-US" smtClean="0"/>
-              <a:t>7/5/2018 1:13 PM</a:t>
+              <a:t>4/1/2019 3:40 PM</a:t>
             </a:fld>
             <a:endParaRPr lang="en-US" dirty="0"/>
           </a:p>
@@ -4863,7 +4863,7 @@
           <a:p>
             <a:fld id="{D18B56EA-E28F-4F92-9F16-7A6F2501B303}" type="datetime8">
               <a:rPr lang="en-US" smtClean="0"/>
-              <a:t>7/5/2018 1:13 PM</a:t>
+              <a:t>4/1/2019 3:40 PM</a:t>
             </a:fld>
             <a:endParaRPr lang="en-US" dirty="0"/>
           </a:p>
@@ -5047,7 +5047,7 @@
           <a:p>
             <a:fld id="{D18B56EA-E28F-4F92-9F16-7A6F2501B303}" type="datetime8">
               <a:rPr lang="en-US" smtClean="0"/>
-              <a:t>7/5/2018 1:13 PM</a:t>
+              <a:t>4/1/2019 3:40 PM</a:t>
             </a:fld>
             <a:endParaRPr lang="en-US" dirty="0"/>
           </a:p>
@@ -5370,7 +5370,7 @@
                 <a:tabLst/>
                 <a:defRPr/>
               </a:pPr>
-              <a:t>7/5/2018 12:55 PM</a:t>
+              <a:t>4/1/2019 3:40 PM</a:t>
             </a:fld>
             <a:endParaRPr kumimoji="0" lang="en-US" sz="4500" b="1" i="0" u="none" strike="noStrike" kern="0" cap="none" spc="0" normalizeH="0" baseline="0" noProof="0" dirty="0">
               <a:ln>
@@ -5638,7 +5638,7 @@
           <a:p>
             <a:fld id="{D18B56EA-E28F-4F92-9F16-7A6F2501B303}" type="datetime8">
               <a:rPr lang="en-US" smtClean="0"/>
-              <a:t>7/5/2018 12:51 PM</a:t>
+              <a:t>4/1/2019 3:40 PM</a:t>
             </a:fld>
             <a:endParaRPr lang="en-US" dirty="0"/>
           </a:p>
@@ -5844,7 +5844,7 @@
           <a:p>
             <a:fld id="{D18B56EA-E28F-4F92-9F16-7A6F2501B303}" type="datetime8">
               <a:rPr lang="en-US" smtClean="0"/>
-              <a:t>7/5/2018 12:51 PM</a:t>
+              <a:t>4/1/2019 3:40 PM</a:t>
             </a:fld>
             <a:endParaRPr lang="en-US" dirty="0"/>
           </a:p>
@@ -15136,7 +15136,7 @@
         <p:spPr>
           <a:xfrm>
             <a:off x="2558299" y="5582454"/>
-            <a:ext cx="2110706" cy="627864"/>
+            <a:ext cx="1128322" cy="627864"/>
           </a:xfrm>
           <a:prstGeom prst="rect">
             <a:avLst/>
@@ -15163,7 +15163,7 @@
                   <a:schemeClr val="bg1"/>
                 </a:solidFill>
               </a:rPr>
-              <a:t>Data Transfer</a:t>
+              <a:t>Share</a:t>
             </a:r>
           </a:p>
         </p:txBody>
@@ -24066,56 +24066,12 @@
 </file>
 
 <file path=customXml/item1.xml><?xml version="1.0" encoding="utf-8"?>
-<p:properties xmlns:p="http://schemas.microsoft.com/office/2006/metadata/properties" xmlns:xsi="http://www.w3.org/2001/XMLSchema-instance" xmlns:pc="http://schemas.microsoft.com/office/infopath/2007/PartnerControls">
-  <documentManagement>
-    <_ip_UnifiedCompliancePolicyUIAction xmlns="http://schemas.microsoft.com/sharepoint/v3" xsi:nil="true"/>
-    <_ip_UnifiedCompliancePolicyProperties xmlns="http://schemas.microsoft.com/sharepoint/v3" xsi:nil="true"/>
-    <LastSharedByUser xmlns="5e12eb9a-f254-44c4-87b3-12e2194c0681">bradyg@microsoft.com</LastSharedByUser>
-    <SharedWithUsers xmlns="5e12eb9a-f254-44c4-87b3-12e2194c0681">
-      <UserInfo>
-        <DisplayName>Sonya Koptyev</DisplayName>
-        <AccountId>497</AccountId>
-        <AccountType/>
-      </UserInfo>
-      <UserInfo>
-        <DisplayName>Michael Crump (AZURE)</DisplayName>
-        <AccountId>3898</AccountId>
-        <AccountType/>
-      </UserInfo>
-      <UserInfo>
-        <DisplayName>Lan Kaim</DisplayName>
-        <AccountId>105</AccountId>
-        <AccountType/>
-      </UserInfo>
-      <UserInfo>
-        <DisplayName>Rajen Kishna</DisplayName>
-        <AccountId>2454</AccountId>
-        <AccountType/>
-      </UserInfo>
-      <UserInfo>
-        <DisplayName>Joanne Marone</DisplayName>
-        <AccountId>766</AccountId>
-        <AccountType/>
-      </UserInfo>
-      <UserInfo>
-        <DisplayName>Prem Prakash</DisplayName>
-        <AccountId>1099</AccountId>
-        <AccountType/>
-      </UserInfo>
-      <UserInfo>
-        <DisplayName>Holly Bilyeu (Run Studios LLC)</DisplayName>
-        <AccountId>501</AccountId>
-        <AccountType/>
-      </UserInfo>
-      <UserInfo>
-        <DisplayName>Allison Vincler (Run Studios LLC)</DisplayName>
-        <AccountId>7280</AccountId>
-        <AccountType/>
-      </UserInfo>
-    </SharedWithUsers>
-    <LastSharedByTime xmlns="5e12eb9a-f254-44c4-87b3-12e2194c0681">2017-10-17T05:55:53+00:00</LastSharedByTime>
-  </documentManagement>
-</p:properties>
+<?mso-contentType ?>
+<FormTemplates xmlns="http://schemas.microsoft.com/sharepoint/v3/contenttype/forms">
+  <Display>DocumentLibraryForm</Display>
+  <Edit>DocumentLibraryForm</Edit>
+  <New>DocumentLibraryForm</New>
+</FormTemplates>
 </file>
 
 <file path=customXml/item2.xml><?xml version="1.0" encoding="utf-8"?>
@@ -24341,28 +24297,62 @@
 </file>
 
 <file path=customXml/item3.xml><?xml version="1.0" encoding="utf-8"?>
-<?mso-contentType ?>
-<FormTemplates xmlns="http://schemas.microsoft.com/sharepoint/v3/contenttype/forms">
-  <Display>DocumentLibraryForm</Display>
-  <Edit>DocumentLibraryForm</Edit>
-  <New>DocumentLibraryForm</New>
-</FormTemplates>
+<p:properties xmlns:p="http://schemas.microsoft.com/office/2006/metadata/properties" xmlns:xsi="http://www.w3.org/2001/XMLSchema-instance" xmlns:pc="http://schemas.microsoft.com/office/infopath/2007/PartnerControls">
+  <documentManagement>
+    <_ip_UnifiedCompliancePolicyUIAction xmlns="http://schemas.microsoft.com/sharepoint/v3" xsi:nil="true"/>
+    <_ip_UnifiedCompliancePolicyProperties xmlns="http://schemas.microsoft.com/sharepoint/v3" xsi:nil="true"/>
+    <LastSharedByUser xmlns="5e12eb9a-f254-44c4-87b3-12e2194c0681">bradyg@microsoft.com</LastSharedByUser>
+    <SharedWithUsers xmlns="5e12eb9a-f254-44c4-87b3-12e2194c0681">
+      <UserInfo>
+        <DisplayName>Sonya Koptyev</DisplayName>
+        <AccountId>497</AccountId>
+        <AccountType/>
+      </UserInfo>
+      <UserInfo>
+        <DisplayName>Michael Crump (AZURE)</DisplayName>
+        <AccountId>3898</AccountId>
+        <AccountType/>
+      </UserInfo>
+      <UserInfo>
+        <DisplayName>Lan Kaim</DisplayName>
+        <AccountId>105</AccountId>
+        <AccountType/>
+      </UserInfo>
+      <UserInfo>
+        <DisplayName>Rajen Kishna</DisplayName>
+        <AccountId>2454</AccountId>
+        <AccountType/>
+      </UserInfo>
+      <UserInfo>
+        <DisplayName>Joanne Marone</DisplayName>
+        <AccountId>766</AccountId>
+        <AccountType/>
+      </UserInfo>
+      <UserInfo>
+        <DisplayName>Prem Prakash</DisplayName>
+        <AccountId>1099</AccountId>
+        <AccountType/>
+      </UserInfo>
+      <UserInfo>
+        <DisplayName>Holly Bilyeu (Run Studios LLC)</DisplayName>
+        <AccountId>501</AccountId>
+        <AccountType/>
+      </UserInfo>
+      <UserInfo>
+        <DisplayName>Allison Vincler (Run Studios LLC)</DisplayName>
+        <AccountId>7280</AccountId>
+        <AccountType/>
+      </UserInfo>
+    </SharedWithUsers>
+    <LastSharedByTime xmlns="5e12eb9a-f254-44c4-87b3-12e2194c0681">2017-10-17T05:55:53+00:00</LastSharedByTime>
+  </documentManagement>
+</p:properties>
 </file>
 
 <file path=customXml/itemProps1.xml><?xml version="1.0" encoding="utf-8"?>
-<ds:datastoreItem xmlns:ds="http://schemas.openxmlformats.org/officeDocument/2006/customXml" ds:itemID="{F990F116-B58F-4255-B05B-DA3808E0E5C6}">
+<ds:datastoreItem xmlns:ds="http://schemas.openxmlformats.org/officeDocument/2006/customXml" ds:itemID="{758FDAC0-319D-4A54-8D8E-1D42CB1F8004}">
   <ds:schemaRefs>
-    <ds:schemaRef ds:uri="http://purl.org/dc/terms/"/>
-    <ds:schemaRef ds:uri="http://schemas.microsoft.com/office/2006/documentManagement/types"/>
-    <ds:schemaRef ds:uri="http://schemas.microsoft.com/office/infopath/2007/PartnerControls"/>
-    <ds:schemaRef ds:uri="http://purl.org/dc/elements/1.1/"/>
-    <ds:schemaRef ds:uri="http://schemas.microsoft.com/office/2006/metadata/properties"/>
-    <ds:schemaRef ds:uri="http://schemas.openxmlformats.org/package/2006/metadata/core-properties"/>
-    <ds:schemaRef ds:uri="f2303881-54ba-440e-bcf5-f004ea0eb02e"/>
-    <ds:schemaRef ds:uri="http://schemas.microsoft.com/sharepoint/v3"/>
-    <ds:schemaRef ds:uri="5e12eb9a-f254-44c4-87b3-12e2194c0681"/>
-    <ds:schemaRef ds:uri="http://www.w3.org/XML/1998/namespace"/>
-    <ds:schemaRef ds:uri="http://purl.org/dc/dcmitype/"/>
+    <ds:schemaRef ds:uri="http://schemas.microsoft.com/sharepoint/v3/contenttype/forms"/>
   </ds:schemaRefs>
 </ds:datastoreItem>
 </file>
@@ -24388,9 +24378,19 @@
 </file>
 
 <file path=customXml/itemProps3.xml><?xml version="1.0" encoding="utf-8"?>
-<ds:datastoreItem xmlns:ds="http://schemas.openxmlformats.org/officeDocument/2006/customXml" ds:itemID="{758FDAC0-319D-4A54-8D8E-1D42CB1F8004}">
+<ds:datastoreItem xmlns:ds="http://schemas.openxmlformats.org/officeDocument/2006/customXml" ds:itemID="{F990F116-B58F-4255-B05B-DA3808E0E5C6}">
   <ds:schemaRefs>
-    <ds:schemaRef ds:uri="http://schemas.microsoft.com/sharepoint/v3/contenttype/forms"/>
+    <ds:schemaRef ds:uri="http://purl.org/dc/terms/"/>
+    <ds:schemaRef ds:uri="http://schemas.microsoft.com/office/2006/documentManagement/types"/>
+    <ds:schemaRef ds:uri="http://schemas.microsoft.com/office/infopath/2007/PartnerControls"/>
+    <ds:schemaRef ds:uri="http://purl.org/dc/elements/1.1/"/>
+    <ds:schemaRef ds:uri="http://schemas.microsoft.com/office/2006/metadata/properties"/>
+    <ds:schemaRef ds:uri="http://schemas.openxmlformats.org/package/2006/metadata/core-properties"/>
+    <ds:schemaRef ds:uri="f2303881-54ba-440e-bcf5-f004ea0eb02e"/>
+    <ds:schemaRef ds:uri="http://schemas.microsoft.com/sharepoint/v3"/>
+    <ds:schemaRef ds:uri="5e12eb9a-f254-44c4-87b3-12e2194c0681"/>
+    <ds:schemaRef ds:uri="http://www.w3.org/XML/1998/namespace"/>
+    <ds:schemaRef ds:uri="http://purl.org/dc/dcmitype/"/>
   </ds:schemaRefs>
 </ds:datastoreItem>
 </file>
</xml_diff>